<commit_message>
Created more readable images for paper
</commit_message>
<xml_diff>
--- a/Manuscript/Figures/02_Data_ecPoint_MultipleWT_SingleWT.pptx
+++ b/Manuscript/Figures/02_Data_ecPoint_MultipleWT_SingleWT.pptx
@@ -5,7 +5,7 @@
     <p:sldMasterId id="2147483672" r:id="rId1"/>
   </p:sldMasterIdLst>
   <p:sldIdLst>
-    <p:sldId id="256" r:id="rId2"/>
+    <p:sldId id="257" r:id="rId2"/>
   </p:sldIdLst>
   <p:sldSz cx="6858000" cy="6173788"/>
   <p:notesSz cx="7010400" cy="9296400"/>
@@ -104,13 +104,18 @@
       </a:defRPr>
     </a:lvl9pPr>
   </p:defaultTextStyle>
+  <p:extLst>
+    <p:ext uri="{EFAFB233-063F-42B5-8137-9DF3F51BA10A}">
+      <p15:sldGuideLst xmlns:p15="http://schemas.microsoft.com/office/powerpoint/2012/main"/>
+    </p:ext>
+  </p:extLst>
 </p:presentation>
 </file>
 
 <file path=ppt/revisionInfo.xml><?xml version="1.0" encoding="utf-8"?>
 <p1510:revInfo xmlns:a="http://schemas.openxmlformats.org/drawingml/2006/main" xmlns:r="http://schemas.openxmlformats.org/officeDocument/2006/relationships" xmlns:p1510="http://schemas.microsoft.com/office/powerpoint/2015/10/main">
   <p1510:revLst>
-    <p1510:client id="{4E0B11EB-DEAF-466A-874A-866CD0D72463}" v="29" dt="2023-09-08T12:50:41.636"/>
+    <p1510:client id="{C6735BE9-3ACC-401C-8984-BE5209826F28}" v="9" dt="2023-09-12T21:06:52.432"/>
   </p1510:revLst>
 </p1510:revInfo>
 </file>
@@ -2136,6 +2141,197 @@
             <pc:docMk/>
             <pc:sldMk cId="3996004554" sldId="256"/>
             <ac:cxnSpMk id="496" creationId="{5C225301-086E-2B7A-9119-9E1937C84959}"/>
+          </ac:cxnSpMkLst>
+        </pc:cxnChg>
+      </pc:sldChg>
+    </pc:docChg>
+  </pc:docChgLst>
+  <pc:docChgLst>
+    <pc:chgData name="Fatima Maria Pillosu" userId="ff035341-0897-461c-8a78-f8f5d53ad921" providerId="ADAL" clId="{C6735BE9-3ACC-401C-8984-BE5209826F28}"/>
+    <pc:docChg chg="custSel addSld delSld modSld">
+      <pc:chgData name="Fatima Maria Pillosu" userId="ff035341-0897-461c-8a78-f8f5d53ad921" providerId="ADAL" clId="{C6735BE9-3ACC-401C-8984-BE5209826F28}" dt="2023-09-12T21:07:15.171" v="920" actId="2696"/>
+      <pc:docMkLst>
+        <pc:docMk/>
+      </pc:docMkLst>
+      <pc:sldChg chg="addSp delSp modSp del mod">
+        <pc:chgData name="Fatima Maria Pillosu" userId="ff035341-0897-461c-8a78-f8f5d53ad921" providerId="ADAL" clId="{C6735BE9-3ACC-401C-8984-BE5209826F28}" dt="2023-09-12T21:07:15.171" v="920" actId="2696"/>
+        <pc:sldMkLst>
+          <pc:docMk/>
+          <pc:sldMk cId="3996004554" sldId="256"/>
+        </pc:sldMkLst>
+        <pc:spChg chg="add mod">
+          <ac:chgData name="Fatima Maria Pillosu" userId="ff035341-0897-461c-8a78-f8f5d53ad921" providerId="ADAL" clId="{C6735BE9-3ACC-401C-8984-BE5209826F28}" dt="2023-09-12T20:50:04.643" v="141" actId="1035"/>
+          <ac:spMkLst>
+            <pc:docMk/>
+            <pc:sldMk cId="3996004554" sldId="256"/>
+            <ac:spMk id="2" creationId="{3AA42F7F-A15D-E3BB-2641-793ECF6E7B02}"/>
+          </ac:spMkLst>
+        </pc:spChg>
+        <pc:spChg chg="add mod">
+          <ac:chgData name="Fatima Maria Pillosu" userId="ff035341-0897-461c-8a78-f8f5d53ad921" providerId="ADAL" clId="{C6735BE9-3ACC-401C-8984-BE5209826F28}" dt="2023-09-12T20:48:06.023" v="107" actId="2085"/>
+          <ac:spMkLst>
+            <pc:docMk/>
+            <pc:sldMk cId="3996004554" sldId="256"/>
+            <ac:spMk id="3" creationId="{CB7A7D16-4DB7-0F52-419B-C9314D976F20}"/>
+          </ac:spMkLst>
+        </pc:spChg>
+        <pc:spChg chg="add mod">
+          <ac:chgData name="Fatima Maria Pillosu" userId="ff035341-0897-461c-8a78-f8f5d53ad921" providerId="ADAL" clId="{C6735BE9-3ACC-401C-8984-BE5209826F28}" dt="2023-09-12T20:48:14.890" v="110" actId="14100"/>
+          <ac:spMkLst>
+            <pc:docMk/>
+            <pc:sldMk cId="3996004554" sldId="256"/>
+            <ac:spMk id="4" creationId="{8772609F-D909-BA67-918D-9B001FA49961}"/>
+          </ac:spMkLst>
+        </pc:spChg>
+        <pc:spChg chg="add mod">
+          <ac:chgData name="Fatima Maria Pillosu" userId="ff035341-0897-461c-8a78-f8f5d53ad921" providerId="ADAL" clId="{C6735BE9-3ACC-401C-8984-BE5209826F28}" dt="2023-09-12T20:50:46.178" v="191" actId="14100"/>
+          <ac:spMkLst>
+            <pc:docMk/>
+            <pc:sldMk cId="3996004554" sldId="256"/>
+            <ac:spMk id="5" creationId="{C855751A-776B-E8E6-AF1B-422EAF24CDFF}"/>
+          </ac:spMkLst>
+        </pc:spChg>
+        <pc:spChg chg="add del mod">
+          <ac:chgData name="Fatima Maria Pillosu" userId="ff035341-0897-461c-8a78-f8f5d53ad921" providerId="ADAL" clId="{C6735BE9-3ACC-401C-8984-BE5209826F28}" dt="2023-09-12T20:54:53.690" v="207" actId="478"/>
+          <ac:spMkLst>
+            <pc:docMk/>
+            <pc:sldMk cId="3996004554" sldId="256"/>
+            <ac:spMk id="6" creationId="{207E7E4F-3014-8998-22FE-7C407C216796}"/>
+          </ac:spMkLst>
+        </pc:spChg>
+        <pc:spChg chg="mod">
+          <ac:chgData name="Fatima Maria Pillosu" userId="ff035341-0897-461c-8a78-f8f5d53ad921" providerId="ADAL" clId="{C6735BE9-3ACC-401C-8984-BE5209826F28}" dt="2023-09-12T20:50:26.785" v="180" actId="1036"/>
+          <ac:spMkLst>
+            <pc:docMk/>
+            <pc:sldMk cId="3996004554" sldId="256"/>
+            <ac:spMk id="501" creationId="{15C5C736-6B0E-2FF3-6B02-CFDC176BFE4E}"/>
+          </ac:spMkLst>
+        </pc:spChg>
+      </pc:sldChg>
+      <pc:sldChg chg="addSp delSp modSp new mod">
+        <pc:chgData name="Fatima Maria Pillosu" userId="ff035341-0897-461c-8a78-f8f5d53ad921" providerId="ADAL" clId="{C6735BE9-3ACC-401C-8984-BE5209826F28}" dt="2023-09-12T21:07:02.567" v="919" actId="14100"/>
+        <pc:sldMkLst>
+          <pc:docMk/>
+          <pc:sldMk cId="2926994625" sldId="257"/>
+        </pc:sldMkLst>
+        <pc:spChg chg="del">
+          <ac:chgData name="Fatima Maria Pillosu" userId="ff035341-0897-461c-8a78-f8f5d53ad921" providerId="ADAL" clId="{C6735BE9-3ACC-401C-8984-BE5209826F28}" dt="2023-09-12T20:51:10.160" v="194" actId="478"/>
+          <ac:spMkLst>
+            <pc:docMk/>
+            <pc:sldMk cId="2926994625" sldId="257"/>
+            <ac:spMk id="2" creationId="{530F935F-6423-9A56-765F-7DC837B9BB55}"/>
+          </ac:spMkLst>
+        </pc:spChg>
+        <pc:spChg chg="del">
+          <ac:chgData name="Fatima Maria Pillosu" userId="ff035341-0897-461c-8a78-f8f5d53ad921" providerId="ADAL" clId="{C6735BE9-3ACC-401C-8984-BE5209826F28}" dt="2023-09-12T20:51:09.132" v="193" actId="478"/>
+          <ac:spMkLst>
+            <pc:docMk/>
+            <pc:sldMk cId="2926994625" sldId="257"/>
+            <ac:spMk id="3" creationId="{60495E0F-D482-BA6C-4449-A56AD9729307}"/>
+          </ac:spMkLst>
+        </pc:spChg>
+        <pc:spChg chg="add mod">
+          <ac:chgData name="Fatima Maria Pillosu" userId="ff035341-0897-461c-8a78-f8f5d53ad921" providerId="ADAL" clId="{C6735BE9-3ACC-401C-8984-BE5209826F28}" dt="2023-09-12T20:56:22.531" v="229" actId="207"/>
+          <ac:spMkLst>
+            <pc:docMk/>
+            <pc:sldMk cId="2926994625" sldId="257"/>
+            <ac:spMk id="14" creationId="{44507A34-A2A6-7B39-B98F-1C5358E9C768}"/>
+          </ac:spMkLst>
+        </pc:spChg>
+        <pc:spChg chg="add mod">
+          <ac:chgData name="Fatima Maria Pillosu" userId="ff035341-0897-461c-8a78-f8f5d53ad921" providerId="ADAL" clId="{C6735BE9-3ACC-401C-8984-BE5209826F28}" dt="2023-09-12T21:03:17.338" v="778" actId="1036"/>
+          <ac:spMkLst>
+            <pc:docMk/>
+            <pc:sldMk cId="2926994625" sldId="257"/>
+            <ac:spMk id="15" creationId="{F9677E60-1415-C8A6-9B42-073AD444BD23}"/>
+          </ac:spMkLst>
+        </pc:spChg>
+        <pc:spChg chg="add mod">
+          <ac:chgData name="Fatima Maria Pillosu" userId="ff035341-0897-461c-8a78-f8f5d53ad921" providerId="ADAL" clId="{C6735BE9-3ACC-401C-8984-BE5209826F28}" dt="2023-09-12T21:03:17.338" v="778" actId="1036"/>
+          <ac:spMkLst>
+            <pc:docMk/>
+            <pc:sldMk cId="2926994625" sldId="257"/>
+            <ac:spMk id="16" creationId="{5504C568-F378-6F1D-BAB2-96536A7F994D}"/>
+          </ac:spMkLst>
+        </pc:spChg>
+        <pc:spChg chg="add mod">
+          <ac:chgData name="Fatima Maria Pillosu" userId="ff035341-0897-461c-8a78-f8f5d53ad921" providerId="ADAL" clId="{C6735BE9-3ACC-401C-8984-BE5209826F28}" dt="2023-09-12T21:04:06.630" v="784" actId="207"/>
+          <ac:spMkLst>
+            <pc:docMk/>
+            <pc:sldMk cId="2926994625" sldId="257"/>
+            <ac:spMk id="17" creationId="{7F4876B5-C2C9-931A-8A72-AE60F3C968E5}"/>
+          </ac:spMkLst>
+        </pc:spChg>
+        <pc:spChg chg="add mod">
+          <ac:chgData name="Fatima Maria Pillosu" userId="ff035341-0897-461c-8a78-f8f5d53ad921" providerId="ADAL" clId="{C6735BE9-3ACC-401C-8984-BE5209826F28}" dt="2023-09-12T21:04:06.630" v="784" actId="207"/>
+          <ac:spMkLst>
+            <pc:docMk/>
+            <pc:sldMk cId="2926994625" sldId="257"/>
+            <ac:spMk id="18" creationId="{E8E8B77E-0DC0-C818-1134-3027198AD6DE}"/>
+          </ac:spMkLst>
+        </pc:spChg>
+        <pc:spChg chg="add mod">
+          <ac:chgData name="Fatima Maria Pillosu" userId="ff035341-0897-461c-8a78-f8f5d53ad921" providerId="ADAL" clId="{C6735BE9-3ACC-401C-8984-BE5209826F28}" dt="2023-09-12T21:06:20.518" v="909" actId="1037"/>
+          <ac:spMkLst>
+            <pc:docMk/>
+            <pc:sldMk cId="2926994625" sldId="257"/>
+            <ac:spMk id="19" creationId="{D47CF567-769B-3CD7-169C-177708E0FC9D}"/>
+          </ac:spMkLst>
+        </pc:spChg>
+        <pc:picChg chg="add del mod">
+          <ac:chgData name="Fatima Maria Pillosu" userId="ff035341-0897-461c-8a78-f8f5d53ad921" providerId="ADAL" clId="{C6735BE9-3ACC-401C-8984-BE5209826F28}" dt="2023-09-12T20:52:40.738" v="199" actId="478"/>
+          <ac:picMkLst>
+            <pc:docMk/>
+            <pc:sldMk cId="2926994625" sldId="257"/>
+            <ac:picMk id="5" creationId="{7294E8D5-D82B-649C-DE1C-651A7F9FE663}"/>
+          </ac:picMkLst>
+        </pc:picChg>
+        <pc:picChg chg="add del mod">
+          <ac:chgData name="Fatima Maria Pillosu" userId="ff035341-0897-461c-8a78-f8f5d53ad921" providerId="ADAL" clId="{C6735BE9-3ACC-401C-8984-BE5209826F28}" dt="2023-09-12T20:52:40.738" v="199" actId="478"/>
+          <ac:picMkLst>
+            <pc:docMk/>
+            <pc:sldMk cId="2926994625" sldId="257"/>
+            <ac:picMk id="7" creationId="{CC39CE25-5A9D-F046-E2F6-E562D363978F}"/>
+          </ac:picMkLst>
+        </pc:picChg>
+        <pc:picChg chg="add mod">
+          <ac:chgData name="Fatima Maria Pillosu" userId="ff035341-0897-461c-8a78-f8f5d53ad921" providerId="ADAL" clId="{C6735BE9-3ACC-401C-8984-BE5209826F28}" dt="2023-09-12T21:03:17.338" v="778" actId="1036"/>
+          <ac:picMkLst>
+            <pc:docMk/>
+            <pc:sldMk cId="2926994625" sldId="257"/>
+            <ac:picMk id="9" creationId="{7F2FE5B8-EA47-08B1-05CF-5EAD8EA94F2D}"/>
+          </ac:picMkLst>
+        </pc:picChg>
+        <pc:picChg chg="add mod modCrop">
+          <ac:chgData name="Fatima Maria Pillosu" userId="ff035341-0897-461c-8a78-f8f5d53ad921" providerId="ADAL" clId="{C6735BE9-3ACC-401C-8984-BE5209826F28}" dt="2023-09-12T21:02:43.248" v="760" actId="1036"/>
+          <ac:picMkLst>
+            <pc:docMk/>
+            <pc:sldMk cId="2926994625" sldId="257"/>
+            <ac:picMk id="11" creationId="{C16E1846-DD32-EC4E-EF31-65FFF0DAAEC4}"/>
+          </ac:picMkLst>
+        </pc:picChg>
+        <pc:picChg chg="add mod">
+          <ac:chgData name="Fatima Maria Pillosu" userId="ff035341-0897-461c-8a78-f8f5d53ad921" providerId="ADAL" clId="{C6735BE9-3ACC-401C-8984-BE5209826F28}" dt="2023-09-12T20:56:03.531" v="223" actId="14100"/>
+          <ac:picMkLst>
+            <pc:docMk/>
+            <pc:sldMk cId="2926994625" sldId="257"/>
+            <ac:picMk id="13" creationId="{CBA43892-416C-6387-BD8B-BD2A96BDDE73}"/>
+          </ac:picMkLst>
+        </pc:picChg>
+        <pc:cxnChg chg="add mod">
+          <ac:chgData name="Fatima Maria Pillosu" userId="ff035341-0897-461c-8a78-f8f5d53ad921" providerId="ADAL" clId="{C6735BE9-3ACC-401C-8984-BE5209826F28}" dt="2023-09-12T21:06:50.085" v="914" actId="1582"/>
+          <ac:cxnSpMkLst>
+            <pc:docMk/>
+            <pc:sldMk cId="2926994625" sldId="257"/>
+            <ac:cxnSpMk id="21" creationId="{00C5CF59-6EFA-3CBE-4E9F-EDC0ADD47015}"/>
+          </ac:cxnSpMkLst>
+        </pc:cxnChg>
+        <pc:cxnChg chg="add mod">
+          <ac:chgData name="Fatima Maria Pillosu" userId="ff035341-0897-461c-8a78-f8f5d53ad921" providerId="ADAL" clId="{C6735BE9-3ACC-401C-8984-BE5209826F28}" dt="2023-09-12T21:07:02.567" v="919" actId="14100"/>
+          <ac:cxnSpMkLst>
+            <pc:docMk/>
+            <pc:sldMk cId="2926994625" sldId="257"/>
+            <ac:cxnSpMk id="23" creationId="{0929806D-C155-29C8-B3BA-3BC052D7A980}"/>
           </ac:cxnSpMkLst>
         </pc:cxnChg>
       </pc:sldChg>
@@ -2275,7 +2471,7 @@
           <a:p>
             <a:fld id="{77389438-6094-4700-81F4-CD9EBE4DE389}" type="datetimeFigureOut">
               <a:rPr lang="en-GB" smtClean="0"/>
-              <a:t>08/09/2023</a:t>
+              <a:t>12/09/2023</a:t>
             </a:fld>
             <a:endParaRPr lang="en-GB"/>
           </a:p>
@@ -2445,7 +2641,7 @@
           <a:p>
             <a:fld id="{77389438-6094-4700-81F4-CD9EBE4DE389}" type="datetimeFigureOut">
               <a:rPr lang="en-GB" smtClean="0"/>
-              <a:t>08/09/2023</a:t>
+              <a:t>12/09/2023</a:t>
             </a:fld>
             <a:endParaRPr lang="en-GB"/>
           </a:p>
@@ -2625,7 +2821,7 @@
           <a:p>
             <a:fld id="{77389438-6094-4700-81F4-CD9EBE4DE389}" type="datetimeFigureOut">
               <a:rPr lang="en-GB" smtClean="0"/>
-              <a:t>08/09/2023</a:t>
+              <a:t>12/09/2023</a:t>
             </a:fld>
             <a:endParaRPr lang="en-GB"/>
           </a:p>
@@ -2795,7 +2991,7 @@
           <a:p>
             <a:fld id="{77389438-6094-4700-81F4-CD9EBE4DE389}" type="datetimeFigureOut">
               <a:rPr lang="en-GB" smtClean="0"/>
-              <a:t>08/09/2023</a:t>
+              <a:t>12/09/2023</a:t>
             </a:fld>
             <a:endParaRPr lang="en-GB"/>
           </a:p>
@@ -3039,7 +3235,7 @@
           <a:p>
             <a:fld id="{77389438-6094-4700-81F4-CD9EBE4DE389}" type="datetimeFigureOut">
               <a:rPr lang="en-GB" smtClean="0"/>
-              <a:t>08/09/2023</a:t>
+              <a:t>12/09/2023</a:t>
             </a:fld>
             <a:endParaRPr lang="en-GB"/>
           </a:p>
@@ -3271,7 +3467,7 @@
           <a:p>
             <a:fld id="{77389438-6094-4700-81F4-CD9EBE4DE389}" type="datetimeFigureOut">
               <a:rPr lang="en-GB" smtClean="0"/>
-              <a:t>08/09/2023</a:t>
+              <a:t>12/09/2023</a:t>
             </a:fld>
             <a:endParaRPr lang="en-GB"/>
           </a:p>
@@ -3638,7 +3834,7 @@
           <a:p>
             <a:fld id="{77389438-6094-4700-81F4-CD9EBE4DE389}" type="datetimeFigureOut">
               <a:rPr lang="en-GB" smtClean="0"/>
-              <a:t>08/09/2023</a:t>
+              <a:t>12/09/2023</a:t>
             </a:fld>
             <a:endParaRPr lang="en-GB"/>
           </a:p>
@@ -3756,7 +3952,7 @@
           <a:p>
             <a:fld id="{77389438-6094-4700-81F4-CD9EBE4DE389}" type="datetimeFigureOut">
               <a:rPr lang="en-GB" smtClean="0"/>
-              <a:t>08/09/2023</a:t>
+              <a:t>12/09/2023</a:t>
             </a:fld>
             <a:endParaRPr lang="en-GB"/>
           </a:p>
@@ -3851,7 +4047,7 @@
           <a:p>
             <a:fld id="{77389438-6094-4700-81F4-CD9EBE4DE389}" type="datetimeFigureOut">
               <a:rPr lang="en-GB" smtClean="0"/>
-              <a:t>08/09/2023</a:t>
+              <a:t>12/09/2023</a:t>
             </a:fld>
             <a:endParaRPr lang="en-GB"/>
           </a:p>
@@ -4128,7 +4324,7 @@
           <a:p>
             <a:fld id="{77389438-6094-4700-81F4-CD9EBE4DE389}" type="datetimeFigureOut">
               <a:rPr lang="en-GB" smtClean="0"/>
-              <a:t>08/09/2023</a:t>
+              <a:t>12/09/2023</a:t>
             </a:fld>
             <a:endParaRPr lang="en-GB"/>
           </a:p>
@@ -4385,7 +4581,7 @@
           <a:p>
             <a:fld id="{77389438-6094-4700-81F4-CD9EBE4DE389}" type="datetimeFigureOut">
               <a:rPr lang="en-GB" smtClean="0"/>
-              <a:t>08/09/2023</a:t>
+              <a:t>12/09/2023</a:t>
             </a:fld>
             <a:endParaRPr lang="en-GB"/>
           </a:p>
@@ -4598,7 +4794,7 @@
           <a:p>
             <a:fld id="{77389438-6094-4700-81F4-CD9EBE4DE389}" type="datetimeFigureOut">
               <a:rPr lang="en-GB" smtClean="0"/>
-              <a:t>08/09/2023</a:t>
+              <a:t>12/09/2023</a:t>
             </a:fld>
             <a:endParaRPr lang="en-GB"/>
           </a:p>
@@ -5003,67 +5199,12 @@
           <a:chExt cx="0" cy="0"/>
         </a:xfrm>
       </p:grpSpPr>
-      <p:sp>
-        <p:nvSpPr>
-          <p:cNvPr id="498" name="Rectangle 497">
+      <p:pic>
+        <p:nvPicPr>
+          <p:cNvPr id="9" name="Picture 8">
             <a:extLst>
               <a:ext uri="{FF2B5EF4-FFF2-40B4-BE49-F238E27FC236}">
-                <a16:creationId xmlns:a16="http://schemas.microsoft.com/office/drawing/2014/main" id="{5E83311A-553E-92B4-3D21-3F81E98F942B}"/>
-              </a:ext>
-            </a:extLst>
-          </p:cNvPr>
-          <p:cNvSpPr/>
-          <p:nvPr/>
-        </p:nvSpPr>
-        <p:spPr>
-          <a:xfrm>
-            <a:off x="24064" y="28506"/>
-            <a:ext cx="6804000" cy="6120000"/>
-          </a:xfrm>
-          <a:prstGeom prst="rect">
-            <a:avLst/>
-          </a:prstGeom>
-          <a:noFill/>
-          <a:ln>
-            <a:solidFill>
-              <a:schemeClr val="tx1">
-                <a:lumMod val="50000"/>
-                <a:lumOff val="50000"/>
-              </a:schemeClr>
-            </a:solidFill>
-          </a:ln>
-        </p:spPr>
-        <p:style>
-          <a:lnRef idx="2">
-            <a:schemeClr val="accent1">
-              <a:shade val="50000"/>
-            </a:schemeClr>
-          </a:lnRef>
-          <a:fillRef idx="1">
-            <a:schemeClr val="accent1"/>
-          </a:fillRef>
-          <a:effectRef idx="0">
-            <a:schemeClr val="accent1"/>
-          </a:effectRef>
-          <a:fontRef idx="minor">
-            <a:schemeClr val="lt1"/>
-          </a:fontRef>
-        </p:style>
-        <p:txBody>
-          <a:bodyPr rtlCol="0" anchor="ctr"/>
-          <a:lstStyle/>
-          <a:p>
-            <a:pPr algn="ctr"/>
-            <a:endParaRPr lang="en-GB"/>
-          </a:p>
-        </p:txBody>
-      </p:sp>
-      <p:pic>
-        <p:nvPicPr>
-          <p:cNvPr id="500" name="Picture 499">
-            <a:extLst>
-              <a:ext uri="{FF2B5EF4-FFF2-40B4-BE49-F238E27FC236}">
-                <a16:creationId xmlns:a16="http://schemas.microsoft.com/office/drawing/2014/main" id="{C085FE08-4CB2-15F7-6B7D-119072A4964B}"/>
+                <a16:creationId xmlns:a16="http://schemas.microsoft.com/office/drawing/2014/main" id="{7F2FE5B8-EA47-08B1-05CF-5EAD8EA94F2D}"/>
               </a:ext>
             </a:extLst>
           </p:cNvPr>
@@ -5080,30 +5221,89 @@
         </p:blipFill>
         <p:spPr>
           <a:xfrm>
-            <a:off x="57626" y="74308"/>
-            <a:ext cx="6688747" cy="6022846"/>
+            <a:off x="2689860" y="514478"/>
+            <a:ext cx="3931920" cy="1848766"/>
           </a:xfrm>
           <a:prstGeom prst="rect">
             <a:avLst/>
           </a:prstGeom>
         </p:spPr>
       </p:pic>
-      <p:sp>
-        <p:nvSpPr>
-          <p:cNvPr id="501" name="TextBox 500">
+      <p:pic>
+        <p:nvPicPr>
+          <p:cNvPr id="11" name="Picture 10">
             <a:extLst>
               <a:ext uri="{FF2B5EF4-FFF2-40B4-BE49-F238E27FC236}">
-                <a16:creationId xmlns:a16="http://schemas.microsoft.com/office/drawing/2014/main" id="{15C5C736-6B0E-2FF3-6B02-CFDC176BFE4E}"/>
+                <a16:creationId xmlns:a16="http://schemas.microsoft.com/office/drawing/2014/main" id="{C16E1846-DD32-EC4E-EF31-65FFF0DAAEC4}"/>
               </a:ext>
             </a:extLst>
           </p:cNvPr>
-          <p:cNvSpPr txBox="1"/>
+          <p:cNvPicPr>
+            <a:picLocks noChangeAspect="1"/>
+          </p:cNvPicPr>
           <p:nvPr/>
-        </p:nvSpPr>
+        </p:nvPicPr>
+        <p:blipFill rotWithShape="1">
+          <a:blip r:embed="rId3"/>
+          <a:srcRect t="37375"/>
+          <a:stretch/>
+        </p:blipFill>
         <p:spPr>
           <a:xfrm>
-            <a:off x="2526632" y="86340"/>
-            <a:ext cx="4219741" cy="370860"/>
+            <a:off x="305632" y="1066800"/>
+            <a:ext cx="1451442" cy="951012"/>
+          </a:xfrm>
+          <a:prstGeom prst="rect">
+            <a:avLst/>
+          </a:prstGeom>
+        </p:spPr>
+      </p:pic>
+      <p:pic>
+        <p:nvPicPr>
+          <p:cNvPr id="13" name="Picture 12">
+            <a:extLst>
+              <a:ext uri="{FF2B5EF4-FFF2-40B4-BE49-F238E27FC236}">
+                <a16:creationId xmlns:a16="http://schemas.microsoft.com/office/drawing/2014/main" id="{CBA43892-416C-6387-BD8B-BD2A96BDDE73}"/>
+              </a:ext>
+            </a:extLst>
+          </p:cNvPr>
+          <p:cNvPicPr>
+            <a:picLocks noChangeAspect="1"/>
+          </p:cNvPicPr>
+          <p:nvPr/>
+        </p:nvPicPr>
+        <p:blipFill>
+          <a:blip r:embed="rId4"/>
+          <a:stretch>
+            <a:fillRect/>
+          </a:stretch>
+        </p:blipFill>
+        <p:spPr>
+          <a:xfrm>
+            <a:off x="1" y="2845227"/>
+            <a:ext cx="6859690" cy="3328561"/>
+          </a:xfrm>
+          <a:prstGeom prst="rect">
+            <a:avLst/>
+          </a:prstGeom>
+        </p:spPr>
+      </p:pic>
+      <p:sp>
+        <p:nvSpPr>
+          <p:cNvPr id="14" name="Rectangle 13">
+            <a:extLst>
+              <a:ext uri="{FF2B5EF4-FFF2-40B4-BE49-F238E27FC236}">
+                <a16:creationId xmlns:a16="http://schemas.microsoft.com/office/drawing/2014/main" id="{44507A34-A2A6-7B39-B98F-1C5358E9C768}"/>
+              </a:ext>
+            </a:extLst>
+          </p:cNvPr>
+          <p:cNvSpPr/>
+          <p:nvPr/>
+        </p:nvSpPr>
+        <p:spPr>
+          <a:xfrm>
+            <a:off x="3802380" y="2712720"/>
+            <a:ext cx="784860" cy="601980"/>
           </a:xfrm>
           <a:prstGeom prst="rect">
             <a:avLst/>
@@ -5111,12 +5311,259 @@
           <a:solidFill>
             <a:schemeClr val="bg1"/>
           </a:solidFill>
+          <a:ln>
+            <a:noFill/>
+          </a:ln>
+        </p:spPr>
+        <p:style>
+          <a:lnRef idx="2">
+            <a:schemeClr val="accent1">
+              <a:shade val="15000"/>
+            </a:schemeClr>
+          </a:lnRef>
+          <a:fillRef idx="1">
+            <a:schemeClr val="accent1"/>
+          </a:fillRef>
+          <a:effectRef idx="0">
+            <a:schemeClr val="accent1"/>
+          </a:effectRef>
+          <a:fontRef idx="minor">
+            <a:schemeClr val="lt1"/>
+          </a:fontRef>
+        </p:style>
+        <p:txBody>
+          <a:bodyPr rtlCol="0" anchor="ctr"/>
+          <a:lstStyle/>
+          <a:p>
+            <a:pPr algn="ctr"/>
+            <a:endParaRPr lang="en-GB"/>
+          </a:p>
+        </p:txBody>
+      </p:sp>
+      <p:sp>
+        <p:nvSpPr>
+          <p:cNvPr id="15" name="Rectangle 14">
+            <a:extLst>
+              <a:ext uri="{FF2B5EF4-FFF2-40B4-BE49-F238E27FC236}">
+                <a16:creationId xmlns:a16="http://schemas.microsoft.com/office/drawing/2014/main" id="{F9677E60-1415-C8A6-9B42-073AD444BD23}"/>
+              </a:ext>
+            </a:extLst>
+          </p:cNvPr>
+          <p:cNvSpPr/>
+          <p:nvPr/>
+        </p:nvSpPr>
+        <p:spPr>
+          <a:xfrm>
+            <a:off x="2956560" y="2211285"/>
+            <a:ext cx="182880" cy="234736"/>
+          </a:xfrm>
+          <a:prstGeom prst="rect">
+            <a:avLst/>
+          </a:prstGeom>
+          <a:solidFill>
+            <a:schemeClr val="bg1"/>
+          </a:solidFill>
+          <a:ln>
+            <a:noFill/>
+          </a:ln>
+        </p:spPr>
+        <p:style>
+          <a:lnRef idx="2">
+            <a:schemeClr val="accent1">
+              <a:shade val="15000"/>
+            </a:schemeClr>
+          </a:lnRef>
+          <a:fillRef idx="1">
+            <a:schemeClr val="accent1"/>
+          </a:fillRef>
+          <a:effectRef idx="0">
+            <a:schemeClr val="accent1"/>
+          </a:effectRef>
+          <a:fontRef idx="minor">
+            <a:schemeClr val="lt1"/>
+          </a:fontRef>
+        </p:style>
+        <p:txBody>
+          <a:bodyPr rtlCol="0" anchor="ctr"/>
+          <a:lstStyle/>
+          <a:p>
+            <a:pPr algn="ctr"/>
+            <a:endParaRPr lang="en-GB"/>
+          </a:p>
+        </p:txBody>
+      </p:sp>
+      <p:sp>
+        <p:nvSpPr>
+          <p:cNvPr id="16" name="Rectangle 15">
+            <a:extLst>
+              <a:ext uri="{FF2B5EF4-FFF2-40B4-BE49-F238E27FC236}">
+                <a16:creationId xmlns:a16="http://schemas.microsoft.com/office/drawing/2014/main" id="{5504C568-F378-6F1D-BAB2-96536A7F994D}"/>
+              </a:ext>
+            </a:extLst>
+          </p:cNvPr>
+          <p:cNvSpPr/>
+          <p:nvPr/>
+        </p:nvSpPr>
+        <p:spPr>
+          <a:xfrm>
+            <a:off x="6530340" y="2184814"/>
+            <a:ext cx="182880" cy="234736"/>
+          </a:xfrm>
+          <a:prstGeom prst="rect">
+            <a:avLst/>
+          </a:prstGeom>
+          <a:solidFill>
+            <a:schemeClr val="bg1"/>
+          </a:solidFill>
+          <a:ln>
+            <a:noFill/>
+          </a:ln>
+        </p:spPr>
+        <p:style>
+          <a:lnRef idx="2">
+            <a:schemeClr val="accent1">
+              <a:shade val="15000"/>
+            </a:schemeClr>
+          </a:lnRef>
+          <a:fillRef idx="1">
+            <a:schemeClr val="accent1"/>
+          </a:fillRef>
+          <a:effectRef idx="0">
+            <a:schemeClr val="accent1"/>
+          </a:effectRef>
+          <a:fontRef idx="minor">
+            <a:schemeClr val="lt1"/>
+          </a:fontRef>
+        </p:style>
+        <p:txBody>
+          <a:bodyPr rtlCol="0" anchor="ctr"/>
+          <a:lstStyle/>
+          <a:p>
+            <a:pPr algn="ctr"/>
+            <a:endParaRPr lang="en-GB"/>
+          </a:p>
+        </p:txBody>
+      </p:sp>
+      <p:sp>
+        <p:nvSpPr>
+          <p:cNvPr id="17" name="TextBox 16">
+            <a:extLst>
+              <a:ext uri="{FF2B5EF4-FFF2-40B4-BE49-F238E27FC236}">
+                <a16:creationId xmlns:a16="http://schemas.microsoft.com/office/drawing/2014/main" id="{7F4876B5-C2C9-931A-8A72-AE60F3C968E5}"/>
+              </a:ext>
+            </a:extLst>
+          </p:cNvPr>
+          <p:cNvSpPr txBox="1"/>
+          <p:nvPr/>
+        </p:nvSpPr>
+        <p:spPr>
+          <a:xfrm>
+            <a:off x="133182" y="374303"/>
+            <a:ext cx="1796341" cy="692497"/>
+          </a:xfrm>
+          <a:prstGeom prst="rect">
+            <a:avLst/>
+          </a:prstGeom>
+          <a:noFill/>
         </p:spPr>
         <p:txBody>
           <a:bodyPr wrap="square" rtlCol="0">
             <a:spAutoFit/>
           </a:bodyPr>
           <a:lstStyle/>
+          <a:p>
+            <a:pPr algn="ctr"/>
+            <a:r>
+              <a:rPr lang="en-US" sz="1200" dirty="0">
+                <a:solidFill>
+                  <a:schemeClr val="tx1">
+                    <a:lumMod val="65000"/>
+                    <a:lumOff val="35000"/>
+                  </a:schemeClr>
+                </a:solidFill>
+              </a:rPr>
+              <a:t>(a)</a:t>
+            </a:r>
+          </a:p>
+          <a:p>
+            <a:pPr algn="ctr"/>
+            <a:r>
+              <a:rPr lang="en-US" sz="900" dirty="0">
+                <a:solidFill>
+                  <a:schemeClr val="tx1">
+                    <a:lumMod val="65000"/>
+                    <a:lumOff val="35000"/>
+                  </a:schemeClr>
+                </a:solidFill>
+              </a:rPr>
+              <a:t>Error formulation for accumulated variables (e.g., rainfall)</a:t>
+            </a:r>
+          </a:p>
+          <a:p>
+            <a:pPr algn="ctr"/>
+            <a:r>
+              <a:rPr lang="en-US" sz="900" b="1" dirty="0">
+                <a:solidFill>
+                  <a:schemeClr val="tx1">
+                    <a:lumMod val="65000"/>
+                    <a:lumOff val="35000"/>
+                  </a:schemeClr>
+                </a:solidFill>
+              </a:rPr>
+              <a:t>FORECAST ERROR RATIO (FER)</a:t>
+            </a:r>
+            <a:endParaRPr lang="en-GB" sz="900" b="1" dirty="0">
+              <a:solidFill>
+                <a:schemeClr val="tx1">
+                  <a:lumMod val="65000"/>
+                  <a:lumOff val="35000"/>
+                </a:schemeClr>
+              </a:solidFill>
+            </a:endParaRPr>
+          </a:p>
+        </p:txBody>
+      </p:sp>
+      <p:sp>
+        <p:nvSpPr>
+          <p:cNvPr id="18" name="TextBox 17">
+            <a:extLst>
+              <a:ext uri="{FF2B5EF4-FFF2-40B4-BE49-F238E27FC236}">
+                <a16:creationId xmlns:a16="http://schemas.microsoft.com/office/drawing/2014/main" id="{E8E8B77E-0DC0-C818-1134-3027198AD6DE}"/>
+              </a:ext>
+            </a:extLst>
+          </p:cNvPr>
+          <p:cNvSpPr txBox="1"/>
+          <p:nvPr/>
+        </p:nvSpPr>
+        <p:spPr>
+          <a:xfrm>
+            <a:off x="2545949" y="-38764"/>
+            <a:ext cx="4219741" cy="553998"/>
+          </a:xfrm>
+          <a:prstGeom prst="rect">
+            <a:avLst/>
+          </a:prstGeom>
+          <a:noFill/>
+        </p:spPr>
+        <p:txBody>
+          <a:bodyPr wrap="square" rtlCol="0">
+            <a:spAutoFit/>
+          </a:bodyPr>
+          <a:lstStyle/>
+          <a:p>
+            <a:pPr algn="ctr"/>
+            <a:r>
+              <a:rPr lang="en-US" sz="1200" dirty="0">
+                <a:solidFill>
+                  <a:schemeClr val="tx1">
+                    <a:lumMod val="65000"/>
+                    <a:lumOff val="35000"/>
+                  </a:schemeClr>
+                </a:solidFill>
+              </a:rPr>
+              <a:t>(b)</a:t>
+            </a:r>
+          </a:p>
           <a:p>
             <a:pPr algn="ctr"/>
             <a:r>
@@ -5155,10 +5602,205 @@
           </a:p>
         </p:txBody>
       </p:sp>
+      <p:sp>
+        <p:nvSpPr>
+          <p:cNvPr id="19" name="TextBox 18">
+            <a:extLst>
+              <a:ext uri="{FF2B5EF4-FFF2-40B4-BE49-F238E27FC236}">
+                <a16:creationId xmlns:a16="http://schemas.microsoft.com/office/drawing/2014/main" id="{D47CF567-769B-3CD7-169C-177708E0FC9D}"/>
+              </a:ext>
+            </a:extLst>
+          </p:cNvPr>
+          <p:cNvSpPr txBox="1"/>
+          <p:nvPr/>
+        </p:nvSpPr>
+        <p:spPr>
+          <a:xfrm>
+            <a:off x="3710940" y="2586906"/>
+            <a:ext cx="3169920" cy="1107996"/>
+          </a:xfrm>
+          <a:prstGeom prst="rect">
+            <a:avLst/>
+          </a:prstGeom>
+          <a:noFill/>
+        </p:spPr>
+        <p:txBody>
+          <a:bodyPr wrap="square" rtlCol="0">
+            <a:spAutoFit/>
+          </a:bodyPr>
+          <a:lstStyle/>
+          <a:p>
+            <a:pPr algn="ctr"/>
+            <a:r>
+              <a:rPr lang="en-US" sz="1200" dirty="0">
+                <a:solidFill>
+                  <a:schemeClr val="tx1">
+                    <a:lumMod val="65000"/>
+                    <a:lumOff val="35000"/>
+                  </a:schemeClr>
+                </a:solidFill>
+              </a:rPr>
+              <a:t>(c)</a:t>
+            </a:r>
+          </a:p>
+          <a:p>
+            <a:pPr algn="ctr"/>
+            <a:r>
+              <a:rPr lang="en-US" sz="900" dirty="0">
+                <a:solidFill>
+                  <a:schemeClr val="tx1">
+                    <a:lumMod val="65000"/>
+                    <a:lumOff val="35000"/>
+                  </a:schemeClr>
+                </a:solidFill>
+              </a:rPr>
+              <a:t>Error distributions used in the post-processing of accumulated NWP model outputs (example provided for rainfall). When they are not split in grid-box weather types (WT), the post-processing approach is called </a:t>
+            </a:r>
+            <a:r>
+              <a:rPr lang="en-US" sz="900" b="1" dirty="0">
+                <a:solidFill>
+                  <a:schemeClr val="tx1">
+                    <a:lumMod val="65000"/>
+                    <a:lumOff val="35000"/>
+                  </a:schemeClr>
+                </a:solidFill>
+              </a:rPr>
+              <a:t>ecPoint_SingleWT</a:t>
+            </a:r>
+            <a:r>
+              <a:rPr lang="en-US" sz="900" dirty="0">
+                <a:solidFill>
+                  <a:schemeClr val="tx1">
+                    <a:lumMod val="65000"/>
+                    <a:lumOff val="35000"/>
+                  </a:schemeClr>
+                </a:solidFill>
+              </a:rPr>
+              <a:t>. When they are, the post-processing approach is called </a:t>
+            </a:r>
+            <a:r>
+              <a:rPr lang="en-US" sz="900" b="1" dirty="0">
+                <a:solidFill>
+                  <a:schemeClr val="tx1">
+                    <a:lumMod val="65000"/>
+                    <a:lumOff val="35000"/>
+                  </a:schemeClr>
+                </a:solidFill>
+              </a:rPr>
+              <a:t>ecPoint_MultipleWT </a:t>
+            </a:r>
+            <a:r>
+              <a:rPr lang="en-US" sz="900" dirty="0">
+                <a:solidFill>
+                  <a:schemeClr val="tx1">
+                    <a:lumMod val="65000"/>
+                    <a:lumOff val="35000"/>
+                  </a:schemeClr>
+                </a:solidFill>
+              </a:rPr>
+              <a:t>and it is based on a decision tree (DT).</a:t>
+            </a:r>
+          </a:p>
+        </p:txBody>
+      </p:sp>
+      <p:cxnSp>
+        <p:nvCxnSpPr>
+          <p:cNvPr id="21" name="Straight Arrow Connector 20">
+            <a:extLst>
+              <a:ext uri="{FF2B5EF4-FFF2-40B4-BE49-F238E27FC236}">
+                <a16:creationId xmlns:a16="http://schemas.microsoft.com/office/drawing/2014/main" id="{00C5CF59-6EFA-3CBE-4E9F-EDC0ADD47015}"/>
+              </a:ext>
+            </a:extLst>
+          </p:cNvPr>
+          <p:cNvCxnSpPr>
+            <a:cxnSpLocks/>
+          </p:cNvCxnSpPr>
+          <p:nvPr/>
+        </p:nvCxnSpPr>
+        <p:spPr>
+          <a:xfrm>
+            <a:off x="1757074" y="1257300"/>
+            <a:ext cx="788875" cy="0"/>
+          </a:xfrm>
+          <a:prstGeom prst="straightConnector1">
+            <a:avLst/>
+          </a:prstGeom>
+          <a:ln w="3175">
+            <a:solidFill>
+              <a:schemeClr val="tx1">
+                <a:lumMod val="50000"/>
+                <a:lumOff val="50000"/>
+              </a:schemeClr>
+            </a:solidFill>
+            <a:tailEnd type="triangle"/>
+          </a:ln>
+        </p:spPr>
+        <p:style>
+          <a:lnRef idx="1">
+            <a:schemeClr val="accent1"/>
+          </a:lnRef>
+          <a:fillRef idx="0">
+            <a:schemeClr val="accent1"/>
+          </a:fillRef>
+          <a:effectRef idx="0">
+            <a:schemeClr val="accent1"/>
+          </a:effectRef>
+          <a:fontRef idx="minor">
+            <a:schemeClr val="tx1"/>
+          </a:fontRef>
+        </p:style>
+      </p:cxnSp>
+      <p:cxnSp>
+        <p:nvCxnSpPr>
+          <p:cNvPr id="23" name="Straight Arrow Connector 22">
+            <a:extLst>
+              <a:ext uri="{FF2B5EF4-FFF2-40B4-BE49-F238E27FC236}">
+                <a16:creationId xmlns:a16="http://schemas.microsoft.com/office/drawing/2014/main" id="{0929806D-C155-29C8-B3BA-3BC052D7A980}"/>
+              </a:ext>
+            </a:extLst>
+          </p:cNvPr>
+          <p:cNvCxnSpPr>
+            <a:cxnSpLocks/>
+          </p:cNvCxnSpPr>
+          <p:nvPr/>
+        </p:nvCxnSpPr>
+        <p:spPr>
+          <a:xfrm flipH="1">
+            <a:off x="3642360" y="2388051"/>
+            <a:ext cx="685800" cy="457176"/>
+          </a:xfrm>
+          <a:prstGeom prst="straightConnector1">
+            <a:avLst/>
+          </a:prstGeom>
+          <a:ln w="3175">
+            <a:solidFill>
+              <a:schemeClr val="tx1">
+                <a:lumMod val="50000"/>
+                <a:lumOff val="50000"/>
+              </a:schemeClr>
+            </a:solidFill>
+            <a:tailEnd type="triangle"/>
+          </a:ln>
+        </p:spPr>
+        <p:style>
+          <a:lnRef idx="1">
+            <a:schemeClr val="accent1"/>
+          </a:lnRef>
+          <a:fillRef idx="0">
+            <a:schemeClr val="accent1"/>
+          </a:fillRef>
+          <a:effectRef idx="0">
+            <a:schemeClr val="accent1"/>
+          </a:effectRef>
+          <a:fontRef idx="minor">
+            <a:schemeClr val="tx1"/>
+          </a:fontRef>
+        </p:style>
+      </p:cxnSp>
     </p:spTree>
     <p:extLst>
       <p:ext uri="{BB962C8B-B14F-4D97-AF65-F5344CB8AC3E}">
-        <p14:creationId xmlns:p14="http://schemas.microsoft.com/office/powerpoint/2010/main" val="3996004554"/>
+        <p14:creationId xmlns:p14="http://schemas.microsoft.com/office/powerpoint/2010/main" val="2926994625"/>
       </p:ext>
     </p:extLst>
   </p:cSld>

</xml_diff>

<commit_message>
Completed second draft for Introduction and Data section
</commit_message>
<xml_diff>
--- a/Manuscript/Figures/02_Data_ecPoint_MultipleWT_SingleWT.pptx
+++ b/Manuscript/Figures/02_Data_ecPoint_MultipleWT_SingleWT.pptx
@@ -112,14 +112,6 @@
 </p:presentation>
 </file>
 
-<file path=ppt/revisionInfo.xml><?xml version="1.0" encoding="utf-8"?>
-<p1510:revInfo xmlns:a="http://schemas.openxmlformats.org/drawingml/2006/main" xmlns:r="http://schemas.openxmlformats.org/officeDocument/2006/relationships" xmlns:p1510="http://schemas.microsoft.com/office/powerpoint/2015/10/main">
-  <p1510:revLst>
-    <p1510:client id="{C6735BE9-3ACC-401C-8984-BE5209826F28}" v="9" dt="2023-09-12T21:06:52.432"/>
-  </p1510:revLst>
-</p1510:revInfo>
-</file>
-
 <file path=ppt/changesInfos/changesInfo1.xml><?xml version="1.0" encoding="utf-8"?>
 <pc:chgInfo xmlns:a="http://schemas.openxmlformats.org/drawingml/2006/main" xmlns:r="http://schemas.openxmlformats.org/officeDocument/2006/relationships" xmlns:ac="http://schemas.microsoft.com/office/drawing/2013/main/command" xmlns:pc="http://schemas.microsoft.com/office/powerpoint/2013/main/command">
   <pc:docChgLst>
@@ -2328,6 +2320,54 @@
         </pc:cxnChg>
         <pc:cxnChg chg="add mod">
           <ac:chgData name="Fatima Maria Pillosu" userId="ff035341-0897-461c-8a78-f8f5d53ad921" providerId="ADAL" clId="{C6735BE9-3ACC-401C-8984-BE5209826F28}" dt="2023-09-12T21:07:02.567" v="919" actId="14100"/>
+          <ac:cxnSpMkLst>
+            <pc:docMk/>
+            <pc:sldMk cId="2926994625" sldId="257"/>
+            <ac:cxnSpMk id="23" creationId="{0929806D-C155-29C8-B3BA-3BC052D7A980}"/>
+          </ac:cxnSpMkLst>
+        </pc:cxnChg>
+      </pc:sldChg>
+    </pc:docChg>
+  </pc:docChgLst>
+  <pc:docChgLst>
+    <pc:chgData name="Fatima Pillosu" userId="a6295d4dc9e22643" providerId="LiveId" clId="{D7327D62-23E7-4CA8-8448-0DCD02C6C6B5}"/>
+    <pc:docChg chg="undo custSel modSld">
+      <pc:chgData name="Fatima Pillosu" userId="a6295d4dc9e22643" providerId="LiveId" clId="{D7327D62-23E7-4CA8-8448-0DCD02C6C6B5}" dt="2023-12-15T17:19:09.990" v="23" actId="1036"/>
+      <pc:docMkLst>
+        <pc:docMk/>
+      </pc:docMkLst>
+      <pc:sldChg chg="modSp mod">
+        <pc:chgData name="Fatima Pillosu" userId="a6295d4dc9e22643" providerId="LiveId" clId="{D7327D62-23E7-4CA8-8448-0DCD02C6C6B5}" dt="2023-12-15T17:19:09.990" v="23" actId="1036"/>
+        <pc:sldMkLst>
+          <pc:docMk/>
+          <pc:sldMk cId="2926994625" sldId="257"/>
+        </pc:sldMkLst>
+        <pc:spChg chg="mod">
+          <ac:chgData name="Fatima Pillosu" userId="a6295d4dc9e22643" providerId="LiveId" clId="{D7327D62-23E7-4CA8-8448-0DCD02C6C6B5}" dt="2023-12-15T16:57:13.884" v="11" actId="20577"/>
+          <ac:spMkLst>
+            <pc:docMk/>
+            <pc:sldMk cId="2926994625" sldId="257"/>
+            <ac:spMk id="17" creationId="{7F4876B5-C2C9-931A-8A72-AE60F3C968E5}"/>
+          </ac:spMkLst>
+        </pc:spChg>
+        <pc:spChg chg="mod">
+          <ac:chgData name="Fatima Pillosu" userId="a6295d4dc9e22643" providerId="LiveId" clId="{D7327D62-23E7-4CA8-8448-0DCD02C6C6B5}" dt="2023-12-15T16:57:12.786" v="9" actId="20577"/>
+          <ac:spMkLst>
+            <pc:docMk/>
+            <pc:sldMk cId="2926994625" sldId="257"/>
+            <ac:spMk id="18" creationId="{E8E8B77E-0DC0-C818-1134-3027198AD6DE}"/>
+          </ac:spMkLst>
+        </pc:spChg>
+        <pc:spChg chg="mod">
+          <ac:chgData name="Fatima Pillosu" userId="a6295d4dc9e22643" providerId="LiveId" clId="{D7327D62-23E7-4CA8-8448-0DCD02C6C6B5}" dt="2023-12-15T17:18:29.065" v="13" actId="1076"/>
+          <ac:spMkLst>
+            <pc:docMk/>
+            <pc:sldMk cId="2926994625" sldId="257"/>
+            <ac:spMk id="19" creationId="{D47CF567-769B-3CD7-169C-177708E0FC9D}"/>
+          </ac:spMkLst>
+        </pc:spChg>
+        <pc:cxnChg chg="mod">
+          <ac:chgData name="Fatima Pillosu" userId="a6295d4dc9e22643" providerId="LiveId" clId="{D7327D62-23E7-4CA8-8448-0DCD02C6C6B5}" dt="2023-12-15T17:19:09.990" v="23" actId="1036"/>
           <ac:cxnSpMkLst>
             <pc:docMk/>
             <pc:sldMk cId="2926994625" sldId="257"/>
@@ -2471,7 +2511,7 @@
           <a:p>
             <a:fld id="{77389438-6094-4700-81F4-CD9EBE4DE389}" type="datetimeFigureOut">
               <a:rPr lang="en-GB" smtClean="0"/>
-              <a:t>12/09/2023</a:t>
+              <a:t>15/12/2023</a:t>
             </a:fld>
             <a:endParaRPr lang="en-GB"/>
           </a:p>
@@ -2513,7 +2553,7 @@
           <a:p>
             <a:fld id="{DA337D59-79EE-4441-A837-7C7F7C0F171B}" type="slidenum">
               <a:rPr lang="en-GB" smtClean="0"/>
-              <a:t>‹#›</a:t>
+              <a:t>‹N›</a:t>
             </a:fld>
             <a:endParaRPr lang="en-GB"/>
           </a:p>
@@ -2641,7 +2681,7 @@
           <a:p>
             <a:fld id="{77389438-6094-4700-81F4-CD9EBE4DE389}" type="datetimeFigureOut">
               <a:rPr lang="en-GB" smtClean="0"/>
-              <a:t>12/09/2023</a:t>
+              <a:t>15/12/2023</a:t>
             </a:fld>
             <a:endParaRPr lang="en-GB"/>
           </a:p>
@@ -2683,7 +2723,7 @@
           <a:p>
             <a:fld id="{DA337D59-79EE-4441-A837-7C7F7C0F171B}" type="slidenum">
               <a:rPr lang="en-GB" smtClean="0"/>
-              <a:t>‹#›</a:t>
+              <a:t>‹N›</a:t>
             </a:fld>
             <a:endParaRPr lang="en-GB"/>
           </a:p>
@@ -2821,7 +2861,7 @@
           <a:p>
             <a:fld id="{77389438-6094-4700-81F4-CD9EBE4DE389}" type="datetimeFigureOut">
               <a:rPr lang="en-GB" smtClean="0"/>
-              <a:t>12/09/2023</a:t>
+              <a:t>15/12/2023</a:t>
             </a:fld>
             <a:endParaRPr lang="en-GB"/>
           </a:p>
@@ -2863,7 +2903,7 @@
           <a:p>
             <a:fld id="{DA337D59-79EE-4441-A837-7C7F7C0F171B}" type="slidenum">
               <a:rPr lang="en-GB" smtClean="0"/>
-              <a:t>‹#›</a:t>
+              <a:t>‹N›</a:t>
             </a:fld>
             <a:endParaRPr lang="en-GB"/>
           </a:p>
@@ -2991,7 +3031,7 @@
           <a:p>
             <a:fld id="{77389438-6094-4700-81F4-CD9EBE4DE389}" type="datetimeFigureOut">
               <a:rPr lang="en-GB" smtClean="0"/>
-              <a:t>12/09/2023</a:t>
+              <a:t>15/12/2023</a:t>
             </a:fld>
             <a:endParaRPr lang="en-GB"/>
           </a:p>
@@ -3033,7 +3073,7 @@
           <a:p>
             <a:fld id="{DA337D59-79EE-4441-A837-7C7F7C0F171B}" type="slidenum">
               <a:rPr lang="en-GB" smtClean="0"/>
-              <a:t>‹#›</a:t>
+              <a:t>‹N›</a:t>
             </a:fld>
             <a:endParaRPr lang="en-GB"/>
           </a:p>
@@ -3235,7 +3275,7 @@
           <a:p>
             <a:fld id="{77389438-6094-4700-81F4-CD9EBE4DE389}" type="datetimeFigureOut">
               <a:rPr lang="en-GB" smtClean="0"/>
-              <a:t>12/09/2023</a:t>
+              <a:t>15/12/2023</a:t>
             </a:fld>
             <a:endParaRPr lang="en-GB"/>
           </a:p>
@@ -3277,7 +3317,7 @@
           <a:p>
             <a:fld id="{DA337D59-79EE-4441-A837-7C7F7C0F171B}" type="slidenum">
               <a:rPr lang="en-GB" smtClean="0"/>
-              <a:t>‹#›</a:t>
+              <a:t>‹N›</a:t>
             </a:fld>
             <a:endParaRPr lang="en-GB"/>
           </a:p>
@@ -3467,7 +3507,7 @@
           <a:p>
             <a:fld id="{77389438-6094-4700-81F4-CD9EBE4DE389}" type="datetimeFigureOut">
               <a:rPr lang="en-GB" smtClean="0"/>
-              <a:t>12/09/2023</a:t>
+              <a:t>15/12/2023</a:t>
             </a:fld>
             <a:endParaRPr lang="en-GB"/>
           </a:p>
@@ -3509,7 +3549,7 @@
           <a:p>
             <a:fld id="{DA337D59-79EE-4441-A837-7C7F7C0F171B}" type="slidenum">
               <a:rPr lang="en-GB" smtClean="0"/>
-              <a:t>‹#›</a:t>
+              <a:t>‹N›</a:t>
             </a:fld>
             <a:endParaRPr lang="en-GB"/>
           </a:p>
@@ -3834,7 +3874,7 @@
           <a:p>
             <a:fld id="{77389438-6094-4700-81F4-CD9EBE4DE389}" type="datetimeFigureOut">
               <a:rPr lang="en-GB" smtClean="0"/>
-              <a:t>12/09/2023</a:t>
+              <a:t>15/12/2023</a:t>
             </a:fld>
             <a:endParaRPr lang="en-GB"/>
           </a:p>
@@ -3876,7 +3916,7 @@
           <a:p>
             <a:fld id="{DA337D59-79EE-4441-A837-7C7F7C0F171B}" type="slidenum">
               <a:rPr lang="en-GB" smtClean="0"/>
-              <a:t>‹#›</a:t>
+              <a:t>‹N›</a:t>
             </a:fld>
             <a:endParaRPr lang="en-GB"/>
           </a:p>
@@ -3952,7 +3992,7 @@
           <a:p>
             <a:fld id="{77389438-6094-4700-81F4-CD9EBE4DE389}" type="datetimeFigureOut">
               <a:rPr lang="en-GB" smtClean="0"/>
-              <a:t>12/09/2023</a:t>
+              <a:t>15/12/2023</a:t>
             </a:fld>
             <a:endParaRPr lang="en-GB"/>
           </a:p>
@@ -3994,7 +4034,7 @@
           <a:p>
             <a:fld id="{DA337D59-79EE-4441-A837-7C7F7C0F171B}" type="slidenum">
               <a:rPr lang="en-GB" smtClean="0"/>
-              <a:t>‹#›</a:t>
+              <a:t>‹N›</a:t>
             </a:fld>
             <a:endParaRPr lang="en-GB"/>
           </a:p>
@@ -4047,7 +4087,7 @@
           <a:p>
             <a:fld id="{77389438-6094-4700-81F4-CD9EBE4DE389}" type="datetimeFigureOut">
               <a:rPr lang="en-GB" smtClean="0"/>
-              <a:t>12/09/2023</a:t>
+              <a:t>15/12/2023</a:t>
             </a:fld>
             <a:endParaRPr lang="en-GB"/>
           </a:p>
@@ -4089,7 +4129,7 @@
           <a:p>
             <a:fld id="{DA337D59-79EE-4441-A837-7C7F7C0F171B}" type="slidenum">
               <a:rPr lang="en-GB" smtClean="0"/>
-              <a:t>‹#›</a:t>
+              <a:t>‹N›</a:t>
             </a:fld>
             <a:endParaRPr lang="en-GB"/>
           </a:p>
@@ -4324,7 +4364,7 @@
           <a:p>
             <a:fld id="{77389438-6094-4700-81F4-CD9EBE4DE389}" type="datetimeFigureOut">
               <a:rPr lang="en-GB" smtClean="0"/>
-              <a:t>12/09/2023</a:t>
+              <a:t>15/12/2023</a:t>
             </a:fld>
             <a:endParaRPr lang="en-GB"/>
           </a:p>
@@ -4366,7 +4406,7 @@
           <a:p>
             <a:fld id="{DA337D59-79EE-4441-A837-7C7F7C0F171B}" type="slidenum">
               <a:rPr lang="en-GB" smtClean="0"/>
-              <a:t>‹#›</a:t>
+              <a:t>‹N›</a:t>
             </a:fld>
             <a:endParaRPr lang="en-GB"/>
           </a:p>
@@ -4581,7 +4621,7 @@
           <a:p>
             <a:fld id="{77389438-6094-4700-81F4-CD9EBE4DE389}" type="datetimeFigureOut">
               <a:rPr lang="en-GB" smtClean="0"/>
-              <a:t>12/09/2023</a:t>
+              <a:t>15/12/2023</a:t>
             </a:fld>
             <a:endParaRPr lang="en-GB"/>
           </a:p>
@@ -4623,7 +4663,7 @@
           <a:p>
             <a:fld id="{DA337D59-79EE-4441-A837-7C7F7C0F171B}" type="slidenum">
               <a:rPr lang="en-GB" smtClean="0"/>
-              <a:t>‹#›</a:t>
+              <a:t>‹N›</a:t>
             </a:fld>
             <a:endParaRPr lang="en-GB"/>
           </a:p>
@@ -4794,7 +4834,7 @@
           <a:p>
             <a:fld id="{77389438-6094-4700-81F4-CD9EBE4DE389}" type="datetimeFigureOut">
               <a:rPr lang="en-GB" smtClean="0"/>
-              <a:t>12/09/2023</a:t>
+              <a:t>15/12/2023</a:t>
             </a:fld>
             <a:endParaRPr lang="en-GB"/>
           </a:p>
@@ -4872,7 +4912,7 @@
           <a:p>
             <a:fld id="{DA337D59-79EE-4441-A837-7C7F7C0F171B}" type="slidenum">
               <a:rPr lang="en-GB" smtClean="0"/>
-              <a:t>‹#›</a:t>
+              <a:t>‹N›</a:t>
             </a:fld>
             <a:endParaRPr lang="en-GB"/>
           </a:p>
@@ -5616,8 +5656,8 @@
         </p:nvSpPr>
         <p:spPr>
           <a:xfrm>
-            <a:off x="3710940" y="2586906"/>
-            <a:ext cx="3169920" cy="1107996"/>
+            <a:off x="3802380" y="3395643"/>
+            <a:ext cx="3169920" cy="276999"/>
           </a:xfrm>
           <a:prstGeom prst="rect">
             <a:avLst/>
@@ -5641,64 +5681,6 @@
                 </a:solidFill>
               </a:rPr>
               <a:t>(c)</a:t>
-            </a:r>
-          </a:p>
-          <a:p>
-            <a:pPr algn="ctr"/>
-            <a:r>
-              <a:rPr lang="en-US" sz="900" dirty="0">
-                <a:solidFill>
-                  <a:schemeClr val="tx1">
-                    <a:lumMod val="65000"/>
-                    <a:lumOff val="35000"/>
-                  </a:schemeClr>
-                </a:solidFill>
-              </a:rPr>
-              <a:t>Error distributions used in the post-processing of accumulated NWP model outputs (example provided for rainfall). When they are not split in grid-box weather types (WT), the post-processing approach is called </a:t>
-            </a:r>
-            <a:r>
-              <a:rPr lang="en-US" sz="900" b="1" dirty="0">
-                <a:solidFill>
-                  <a:schemeClr val="tx1">
-                    <a:lumMod val="65000"/>
-                    <a:lumOff val="35000"/>
-                  </a:schemeClr>
-                </a:solidFill>
-              </a:rPr>
-              <a:t>ecPoint_SingleWT</a:t>
-            </a:r>
-            <a:r>
-              <a:rPr lang="en-US" sz="900" dirty="0">
-                <a:solidFill>
-                  <a:schemeClr val="tx1">
-                    <a:lumMod val="65000"/>
-                    <a:lumOff val="35000"/>
-                  </a:schemeClr>
-                </a:solidFill>
-              </a:rPr>
-              <a:t>. When they are, the post-processing approach is called </a:t>
-            </a:r>
-            <a:r>
-              <a:rPr lang="en-US" sz="900" b="1" dirty="0">
-                <a:solidFill>
-                  <a:schemeClr val="tx1">
-                    <a:lumMod val="65000"/>
-                    <a:lumOff val="35000"/>
-                  </a:schemeClr>
-                </a:solidFill>
-              </a:rPr>
-              <a:t>ecPoint_MultipleWT </a:t>
-            </a:r>
-            <a:r>
-              <a:rPr lang="en-US" sz="900" dirty="0">
-                <a:solidFill>
-                  <a:schemeClr val="tx1">
-                    <a:lumMod val="65000"/>
-                    <a:lumOff val="35000"/>
-                  </a:schemeClr>
-                </a:solidFill>
-              </a:rPr>
-              <a:t>and it is based on a decision tree (DT).</a:t>
             </a:r>
           </a:p>
         </p:txBody>
@@ -5765,9 +5747,9 @@
           <p:nvPr/>
         </p:nvCxnSpPr>
         <p:spPr>
-          <a:xfrm flipH="1">
-            <a:off x="3642360" y="2388051"/>
-            <a:ext cx="685800" cy="457176"/>
+          <a:xfrm>
+            <a:off x="3429846" y="2413578"/>
+            <a:ext cx="0" cy="349476"/>
           </a:xfrm>
           <a:prstGeom prst="straightConnector1">
             <a:avLst/>

</xml_diff>